<commit_message>
ppt main method changed
</commit_message>
<xml_diff>
--- a/gRPC培训-1.0.pptx
+++ b/gRPC培训-1.0.pptx
@@ -17183,8 +17183,8 @@
         </p:nvSpPr>
         <p:spPr>
           <a:xfrm>
-            <a:off x="989965" y="1773555"/>
-            <a:ext cx="9001125" cy="4246245"/>
+            <a:off x="520065" y="1773555"/>
+            <a:ext cx="9001125" cy="2676525"/>
           </a:xfrm>
           <a:prstGeom prst="rect">
             <a:avLst/>
@@ -17197,21 +17197,29 @@
           </a:bodyPr>
           <a:p>
             <a:r>
-              <a:rPr lang="en-US" altLang="zh-CN" sz="5400" b="1">
+              <a:rPr lang="en-US" altLang="zh-CN" sz="2800" b="1">
                 <a:solidFill>
                   <a:schemeClr val="bg1"/>
                 </a:solidFill>
               </a:rPr>
               <a:t>fn main() {</a:t>
             </a:r>
-            <a:endParaRPr lang="en-US" altLang="zh-CN" sz="5400" b="1">
+            <a:endParaRPr lang="en-US" altLang="zh-CN" sz="2800" b="1">
               <a:solidFill>
                 <a:schemeClr val="bg1"/>
               </a:solidFill>
             </a:endParaRPr>
           </a:p>
           <a:p>
-            <a:endParaRPr lang="en-US" altLang="zh-CN" sz="5400" b="1">
+            <a:r>
+              <a:rPr lang="en-US" altLang="zh-CN" sz="2800" b="1">
+                <a:solidFill>
+                  <a:schemeClr val="bg1"/>
+                </a:solidFill>
+              </a:rPr>
+              <a:t>    let x=1;</a:t>
+            </a:r>
+            <a:endParaRPr lang="en-US" altLang="zh-CN" sz="2800" b="1">
               <a:solidFill>
                 <a:schemeClr val="bg1"/>
               </a:solidFill>
@@ -17219,36 +17227,155 @@
           </a:p>
           <a:p>
             <a:r>
-              <a:rPr lang="en-US" altLang="zh-CN" sz="5400" b="1">
+              <a:rPr lang="en-US" altLang="zh-CN" sz="2800" b="1">
                 <a:solidFill>
                   <a:schemeClr val="bg1"/>
                 </a:solidFill>
               </a:rPr>
-              <a:t>    println!(“Hello,world!”);</a:t>
-            </a:r>
-            <a:endParaRPr lang="en-US" altLang="zh-CN" sz="5400" b="1">
+              <a:t>    x=x+6;</a:t>
+            </a:r>
+            <a:endParaRPr lang="en-US" altLang="zh-CN" sz="2800" b="1">
               <a:solidFill>
                 <a:schemeClr val="bg1"/>
               </a:solidFill>
             </a:endParaRPr>
           </a:p>
           <a:p>
-            <a:endParaRPr lang="en-US" altLang="zh-CN" sz="5400" b="1">
+            <a:r>
+              <a:rPr lang="en-US" altLang="zh-CN" sz="2800" b="1">
+                <a:solidFill>
+                  <a:schemeClr val="bg1"/>
+                </a:solidFill>
+              </a:rPr>
+              <a:t>    println!(“Hello,world! {}”,x);</a:t>
+            </a:r>
+            <a:endParaRPr lang="en-US" altLang="zh-CN" sz="2800" b="1">
               <a:solidFill>
                 <a:schemeClr val="bg1"/>
               </a:solidFill>
             </a:endParaRPr>
           </a:p>
           <a:p>
-            <a:r>
-              <a:rPr lang="en-US" altLang="zh-CN" sz="5400" b="1">
+            <a:endParaRPr lang="en-US" altLang="zh-CN" sz="2800" b="1">
+              <a:solidFill>
+                <a:schemeClr val="bg1"/>
+              </a:solidFill>
+            </a:endParaRPr>
+          </a:p>
+          <a:p>
+            <a:r>
+              <a:rPr lang="en-US" altLang="zh-CN" sz="2800" b="1">
                 <a:solidFill>
                   <a:schemeClr val="bg1"/>
                 </a:solidFill>
               </a:rPr>
               <a:t>}</a:t>
             </a:r>
-            <a:endParaRPr lang="en-US" altLang="zh-CN" sz="5400" b="1">
+            <a:endParaRPr lang="en-US" altLang="zh-CN" sz="2800" b="1">
+              <a:solidFill>
+                <a:schemeClr val="bg1"/>
+              </a:solidFill>
+            </a:endParaRPr>
+          </a:p>
+        </p:txBody>
+      </p:sp>
+      <p:sp>
+        <p:nvSpPr>
+          <p:cNvPr id="3" name="文本框 2"/>
+          <p:cNvSpPr txBox="1"/>
+          <p:nvPr/>
+        </p:nvSpPr>
+        <p:spPr>
+          <a:xfrm>
+            <a:off x="6478905" y="1773555"/>
+            <a:ext cx="9001125" cy="2676525"/>
+          </a:xfrm>
+          <a:prstGeom prst="rect">
+            <a:avLst/>
+          </a:prstGeom>
+          <a:noFill/>
+        </p:spPr>
+        <p:txBody>
+          <a:bodyPr wrap="square" rtlCol="0">
+            <a:spAutoFit/>
+          </a:bodyPr>
+          <a:p>
+            <a:r>
+              <a:rPr lang="en-US" altLang="zh-CN" sz="2800" b="1">
+                <a:solidFill>
+                  <a:schemeClr val="bg1"/>
+                </a:solidFill>
+              </a:rPr>
+              <a:t>fn main() {</a:t>
+            </a:r>
+            <a:endParaRPr lang="en-US" altLang="zh-CN" sz="2800" b="1">
+              <a:solidFill>
+                <a:schemeClr val="bg1"/>
+              </a:solidFill>
+            </a:endParaRPr>
+          </a:p>
+          <a:p>
+            <a:r>
+              <a:rPr lang="en-US" altLang="zh-CN" sz="2800" b="1">
+                <a:solidFill>
+                  <a:schemeClr val="bg1"/>
+                </a:solidFill>
+              </a:rPr>
+              <a:t>    let x=1;</a:t>
+            </a:r>
+            <a:endParaRPr lang="en-US" altLang="zh-CN" sz="2800" b="1">
+              <a:solidFill>
+                <a:schemeClr val="bg1"/>
+              </a:solidFill>
+            </a:endParaRPr>
+          </a:p>
+          <a:p>
+            <a:r>
+              <a:rPr lang="en-US" altLang="zh-CN" sz="2800" b="1">
+                <a:solidFill>
+                  <a:schemeClr val="bg1"/>
+                </a:solidFill>
+              </a:rPr>
+              <a:t>    let x=x+6;</a:t>
+            </a:r>
+            <a:endParaRPr lang="en-US" altLang="zh-CN" sz="2800" b="1">
+              <a:solidFill>
+                <a:schemeClr val="bg1"/>
+              </a:solidFill>
+            </a:endParaRPr>
+          </a:p>
+          <a:p>
+            <a:r>
+              <a:rPr lang="en-US" altLang="zh-CN" sz="2800" b="1">
+                <a:solidFill>
+                  <a:schemeClr val="bg1"/>
+                </a:solidFill>
+              </a:rPr>
+              <a:t>    println!(“Hello,world! {}”,x);</a:t>
+            </a:r>
+            <a:endParaRPr lang="en-US" altLang="zh-CN" sz="2800" b="1">
+              <a:solidFill>
+                <a:schemeClr val="bg1"/>
+              </a:solidFill>
+            </a:endParaRPr>
+          </a:p>
+          <a:p>
+            <a:endParaRPr lang="en-US" altLang="zh-CN" sz="2800" b="1">
+              <a:solidFill>
+                <a:schemeClr val="bg1"/>
+              </a:solidFill>
+            </a:endParaRPr>
+          </a:p>
+          <a:p>
+            <a:r>
+              <a:rPr lang="en-US" altLang="zh-CN" sz="2800" b="1">
+                <a:solidFill>
+                  <a:schemeClr val="bg1"/>
+                </a:solidFill>
+              </a:rPr>
+              <a:t>}</a:t>
+            </a:r>
+            <a:endParaRPr lang="en-US" altLang="zh-CN" sz="2800" b="1">
               <a:solidFill>
                 <a:schemeClr val="bg1"/>
               </a:solidFill>

</xml_diff>